<commit_message>
new version from delivering tutorial
</commit_message>
<xml_diff>
--- a/ch2-fo-bayes-nets.pptx
+++ b/ch2-fo-bayes-nets.pptx
@@ -347,7 +347,7 @@
               <a:pPr>
                 <a:defRPr/>
               </a:pPr>
-              <a:t>2017-02-02</a:t>
+              <a:t>2017-02-04</a:t>
             </a:fld>
             <a:endParaRPr lang="en-US"/>
           </a:p>
@@ -563,7 +563,7 @@
               <a:pPr>
                 <a:defRPr/>
               </a:pPr>
-              <a:t>2017-02-02</a:t>
+              <a:t>2017-02-04</a:t>
             </a:fld>
             <a:endParaRPr lang="en-US"/>
           </a:p>
@@ -953,6 +953,17 @@
               <a:rPr lang="en-US" dirty="0" err="1" smtClean="0"/>
               <a:t>bayes</a:t>
             </a:r>
+            <a:endParaRPr lang="en-US" dirty="0" smtClean="0"/>
+          </a:p>
+          <a:p>
+            <a:r>
+              <a:rPr lang="en-US" dirty="0" smtClean="0"/>
+              <a:t>don’t need </a:t>
+            </a:r>
+            <a:r>
+              <a:rPr lang="en-US" smtClean="0"/>
+              <a:t>data access</a:t>
+            </a:r>
             <a:endParaRPr lang="en-US" dirty="0"/>
           </a:p>
         </p:txBody>
@@ -1679,18 +1690,6 @@
           <a:bodyPr/>
           <a:lstStyle/>
           <a:p>
-            <a:r>
-              <a:rPr lang="en-US" dirty="0" err="1" smtClean="0"/>
-              <a:t>todo</a:t>
-            </a:r>
-            <a:r>
-              <a:rPr lang="en-US" dirty="0" smtClean="0"/>
-              <a:t>: make</a:t>
-            </a:r>
-            <a:r>
-              <a:rPr lang="en-US" baseline="0" dirty="0" smtClean="0"/>
-              <a:t> EER diagram with 3 relationships</a:t>
-            </a:r>
             <a:endParaRPr lang="en-US" dirty="0"/>
           </a:p>
         </p:txBody>
@@ -1801,21 +1800,13 @@
             </a:r>
             <a:r>
               <a:rPr lang="en-US" baseline="0" dirty="0" smtClean="0"/>
-              <a:t> with link analysis on</a:t>
-            </a:r>
-          </a:p>
-          <a:p>
+              <a:t> with link analysis </a:t>
+            </a:r>
             <a:r>
               <a:rPr lang="en-US" baseline="0" dirty="0" smtClean="0"/>
-              <a:t>*rename columns to generate IMDB EER diagram with 3 relationships</a:t>
-            </a:r>
-          </a:p>
-          <a:p>
-            <a:r>
-              <a:rPr lang="en-US" baseline="0" dirty="0" smtClean="0"/>
-              <a:t>*upload to Prague dataset</a:t>
-            </a:r>
-            <a:endParaRPr lang="en-US" dirty="0"/>
+              <a:t>on</a:t>
+            </a:r>
+            <a:endParaRPr lang="en-US" baseline="0" dirty="0" smtClean="0"/>
           </a:p>
         </p:txBody>
       </p:sp>
@@ -2010,13 +2001,6 @@
           <a:lstStyle/>
           <a:p>
             <a:endParaRPr lang="en-US" dirty="0" smtClean="0"/>
-          </a:p>
-          <a:p>
-            <a:r>
-              <a:rPr lang="en-US" baseline="0" dirty="0" smtClean="0"/>
-              <a:t>put pictures and xml files on-line</a:t>
-            </a:r>
-            <a:endParaRPr lang="en-US" dirty="0"/>
           </a:p>
         </p:txBody>
       </p:sp>
@@ -4034,7 +4018,7 @@
               <a:pPr>
                 <a:defRPr/>
               </a:pPr>
-              <a:t>2017-02-02</a:t>
+              <a:t>2017-02-04</a:t>
             </a:fld>
             <a:endParaRPr lang="en-US"/>
           </a:p>
@@ -4231,7 +4215,7 @@
               <a:pPr>
                 <a:defRPr/>
               </a:pPr>
-              <a:t>2017-02-02</a:t>
+              <a:t>2017-02-04</a:t>
             </a:fld>
             <a:endParaRPr lang="en-US"/>
           </a:p>
@@ -4442,7 +4426,7 @@
               <a:pPr>
                 <a:defRPr/>
               </a:pPr>
-              <a:t>2017-02-02</a:t>
+              <a:t>2017-02-04</a:t>
             </a:fld>
             <a:endParaRPr lang="en-US"/>
           </a:p>
@@ -4648,7 +4632,7 @@
               <a:pPr>
                 <a:defRPr/>
               </a:pPr>
-              <a:t>2017-02-02</a:t>
+              <a:t>2017-02-04</a:t>
             </a:fld>
             <a:endParaRPr lang="en-US"/>
           </a:p>
@@ -5167,7 +5151,7 @@
               <a:pPr>
                 <a:defRPr/>
               </a:pPr>
-              <a:t>2017-02-02</a:t>
+              <a:t>2017-02-04</a:t>
             </a:fld>
             <a:endParaRPr lang="en-US"/>
           </a:p>
@@ -5436,7 +5420,7 @@
               <a:pPr>
                 <a:defRPr/>
               </a:pPr>
-              <a:t>2017-02-02</a:t>
+              <a:t>2017-02-04</a:t>
             </a:fld>
             <a:endParaRPr lang="en-US"/>
           </a:p>
@@ -5834,7 +5818,7 @@
               <a:pPr>
                 <a:defRPr/>
               </a:pPr>
-              <a:t>2017-02-02</a:t>
+              <a:t>2017-02-04</a:t>
             </a:fld>
             <a:endParaRPr lang="en-US"/>
           </a:p>
@@ -5983,7 +5967,7 @@
               <a:pPr>
                 <a:defRPr/>
               </a:pPr>
-              <a:t>2017-02-02</a:t>
+              <a:t>2017-02-04</a:t>
             </a:fld>
             <a:endParaRPr lang="en-US"/>
           </a:p>
@@ -6109,7 +6093,7 @@
               <a:pPr>
                 <a:defRPr/>
               </a:pPr>
-              <a:t>2017-02-02</a:t>
+              <a:t>2017-02-04</a:t>
             </a:fld>
             <a:endParaRPr lang="en-US"/>
           </a:p>
@@ -6485,7 +6469,7 @@
               <a:pPr>
                 <a:defRPr/>
               </a:pPr>
-              <a:t>2017-02-02</a:t>
+              <a:t>2017-02-04</a:t>
             </a:fld>
             <a:endParaRPr lang="en-US"/>
           </a:p>
@@ -6908,7 +6892,7 @@
               <a:pPr>
                 <a:defRPr/>
               </a:pPr>
-              <a:t>2017-02-02</a:t>
+              <a:t>2017-02-04</a:t>
             </a:fld>
             <a:endParaRPr lang="en-US"/>
           </a:p>
@@ -7328,7 +7312,7 @@
               <a:pPr>
                 <a:defRPr/>
               </a:pPr>
-              <a:t>2017-02-02</a:t>
+              <a:t>2017-02-04</a:t>
             </a:fld>
             <a:endParaRPr lang="en-US"/>
           </a:p>
@@ -9186,6 +9170,13 @@
   <p:clrMapOvr>
     <a:masterClrMapping/>
   </p:clrMapOvr>
+  <p:timing>
+    <p:tnLst>
+      <p:par>
+        <p:cTn xmlns:p14="http://schemas.microsoft.com/office/powerpoint/2010/main" id="1" dur="indefinite" restart="never" nodeType="tmRoot"/>
+      </p:par>
+    </p:tnLst>
+  </p:timing>
 </p:sld>
 </file>
 
@@ -15338,6 +15329,13 @@
   <p:clrMapOvr>
     <a:masterClrMapping/>
   </p:clrMapOvr>
+  <p:timing>
+    <p:tnLst>
+      <p:par>
+        <p:cTn xmlns:p14="http://schemas.microsoft.com/office/powerpoint/2010/main" id="1" dur="indefinite" restart="never" nodeType="tmRoot"/>
+      </p:par>
+    </p:tnLst>
+  </p:timing>
 </p:sld>
 </file>
 
@@ -15406,9 +15404,40 @@
           </a:p>
         </p:txBody>
       </p:sp>
+      <p:sp>
+        <p:nvSpPr>
+          <p:cNvPr id="8" name="TextBox 7"/>
+          <p:cNvSpPr txBox="1"/>
+          <p:nvPr/>
+        </p:nvSpPr>
+        <p:spPr>
+          <a:xfrm>
+            <a:off x="1091608" y="1698002"/>
+            <a:ext cx="3524538" cy="400110"/>
+          </a:xfrm>
+          <a:prstGeom prst="rect">
+            <a:avLst/>
+          </a:prstGeom>
+          <a:noFill/>
+        </p:spPr>
+        <p:txBody>
+          <a:bodyPr wrap="square" rtlCol="0">
+            <a:spAutoFit/>
+          </a:bodyPr>
+          <a:lstStyle/>
+          <a:p>
+            <a:r>
+              <a:rPr lang="en-US" sz="2000" dirty="0">
+                <a:latin typeface="+mn-lt"/>
+              </a:rPr>
+              <a:t>data with two relationships</a:t>
+            </a:r>
+          </a:p>
+        </p:txBody>
+      </p:sp>
       <p:pic>
         <p:nvPicPr>
-          <p:cNvPr id="7" name="Content Placeholder 6" descr="eer-imdb_2r.pdf"/>
+          <p:cNvPr id="5" name="Content Placeholder 4" descr="eer-imdb_2r.pdf"/>
           <p:cNvPicPr>
             <a:picLocks noGrp="1" noChangeAspect="1"/>
           </p:cNvPicPr>
@@ -15431,37 +15460,6 @@
         </p:blipFill>
         <p:spPr/>
       </p:pic>
-      <p:sp>
-        <p:nvSpPr>
-          <p:cNvPr id="8" name="TextBox 7"/>
-          <p:cNvSpPr txBox="1"/>
-          <p:nvPr/>
-        </p:nvSpPr>
-        <p:spPr>
-          <a:xfrm>
-            <a:off x="1091608" y="1698002"/>
-            <a:ext cx="3524538" cy="400110"/>
-          </a:xfrm>
-          <a:prstGeom prst="rect">
-            <a:avLst/>
-          </a:prstGeom>
-          <a:noFill/>
-        </p:spPr>
-        <p:txBody>
-          <a:bodyPr wrap="square" rtlCol="0">
-            <a:spAutoFit/>
-          </a:bodyPr>
-          <a:lstStyle/>
-          <a:p>
-            <a:r>
-              <a:rPr lang="en-US" sz="2000" dirty="0">
-                <a:latin typeface="+mn-lt"/>
-              </a:rPr>
-              <a:t>data with two relationships</a:t>
-            </a:r>
-          </a:p>
-        </p:txBody>
-      </p:sp>
     </p:spTree>
     <p:extLst>
       <p:ext uri="{BB962C8B-B14F-4D97-AF65-F5344CB8AC3E}">
@@ -15588,6 +15586,13 @@
   <p:clrMapOvr>
     <a:masterClrMapping/>
   </p:clrMapOvr>
+  <p:timing>
+    <p:tnLst>
+      <p:par>
+        <p:cTn xmlns:p14="http://schemas.microsoft.com/office/powerpoint/2010/main" id="1" dur="indefinite" restart="never" nodeType="tmRoot"/>
+      </p:par>
+    </p:tnLst>
+  </p:timing>
 </p:sld>
 </file>
 
@@ -16533,7 +16538,7 @@
           </p:nvPr>
         </p:nvPicPr>
         <p:blipFill>
-          <a:blip r:link="rId3">
+          <a:blip r:embed="rId3">
             <a:extLst>
               <a:ext uri="{28A0092B-C50C-407E-A947-70E740481C1C}">
                 <a14:useLocalDpi xmlns:a14="http://schemas.microsoft.com/office/drawing/2010/main" val="0"/>
@@ -17772,14 +17777,24 @@
             </a:br>
             <a:r>
               <a:rPr lang="en-US" sz="2800" dirty="0" smtClean="0"/>
-              <a:t>number of possible instantiations.</a:t>
-            </a:r>
-          </a:p>
-          <a:p>
+              <a:t>number of possible </a:t>
+            </a:r>
             <a:r>
               <a:rPr lang="en-US" sz="2800" dirty="0" smtClean="0"/>
-              <a:t>First-order Bayesian networks represent frequencies of conjunctive formulas very well.</a:t>
-            </a:r>
+              <a:t>instantiations</a:t>
+            </a:r>
+            <a:endParaRPr lang="en-US" sz="2800" dirty="0" smtClean="0"/>
+          </a:p>
+          <a:p>
+            <a:r>
+              <a:rPr lang="en-US" sz="2800" dirty="0" smtClean="0"/>
+              <a:t>First-order Bayesian networks represent frequencies of conjunctive formulas very </a:t>
+            </a:r>
+            <a:r>
+              <a:rPr lang="en-US" sz="2800" dirty="0" smtClean="0"/>
+              <a:t>well</a:t>
+            </a:r>
+            <a:endParaRPr lang="en-US" sz="2800" dirty="0" smtClean="0"/>
           </a:p>
           <a:p>
             <a:pPr lvl="1"/>

</xml_diff>